<commit_message>
edit first page of docs
</commit_message>
<xml_diff>
--- a/doggo ppt.pptx
+++ b/doggo ppt.pptx
@@ -5,7 +5,7 @@
     <p:sldMasterId id="2147483696" r:id="rId1"/>
   </p:sldMasterIdLst>
   <p:sldIdLst>
-    <p:sldId id="256" r:id="rId2"/>
+    <p:sldId id="279" r:id="rId2"/>
     <p:sldId id="272" r:id="rId3"/>
     <p:sldId id="273" r:id="rId4"/>
     <p:sldId id="274" r:id="rId5"/>
@@ -122,6 +122,11 @@
       </a:defRPr>
     </a:lvl9pPr>
   </p:defaultTextStyle>
+  <p:extLst>
+    <p:ext uri="{EFAFB233-063F-42B5-8137-9DF3F51BA10A}">
+      <p15:sldGuideLst xmlns:p15="http://schemas.microsoft.com/office/powerpoint/2012/main"/>
+    </p:ext>
+  </p:extLst>
 </p:presentation>
 </file>
 
@@ -311,7 +316,7 @@
           <a:p>
             <a:fld id="{D1D0716B-8702-40F4-8954-70B29D0B46EA}" type="datetimeFigureOut">
               <a:rPr lang="en-IN" smtClean="0"/>
-              <a:t>12-05-2023</a:t>
+              <a:t>13-05-2023</a:t>
             </a:fld>
             <a:endParaRPr lang="en-IN"/>
           </a:p>
@@ -586,7 +591,7 @@
           <a:p>
             <a:fld id="{D1D0716B-8702-40F4-8954-70B29D0B46EA}" type="datetimeFigureOut">
               <a:rPr lang="en-IN" smtClean="0"/>
-              <a:t>12-05-2023</a:t>
+              <a:t>13-05-2023</a:t>
             </a:fld>
             <a:endParaRPr lang="en-IN"/>
           </a:p>
@@ -780,7 +785,7 @@
           <a:p>
             <a:fld id="{D1D0716B-8702-40F4-8954-70B29D0B46EA}" type="datetimeFigureOut">
               <a:rPr lang="en-IN" smtClean="0"/>
-              <a:t>12-05-2023</a:t>
+              <a:t>13-05-2023</a:t>
             </a:fld>
             <a:endParaRPr lang="en-IN"/>
           </a:p>
@@ -1053,7 +1058,7 @@
           <a:p>
             <a:fld id="{D1D0716B-8702-40F4-8954-70B29D0B46EA}" type="datetimeFigureOut">
               <a:rPr lang="en-IN" smtClean="0"/>
-              <a:t>12-05-2023</a:t>
+              <a:t>13-05-2023</a:t>
             </a:fld>
             <a:endParaRPr lang="en-IN"/>
           </a:p>
@@ -1394,7 +1399,7 @@
           <a:p>
             <a:fld id="{D1D0716B-8702-40F4-8954-70B29D0B46EA}" type="datetimeFigureOut">
               <a:rPr lang="en-IN" smtClean="0"/>
-              <a:t>12-05-2023</a:t>
+              <a:t>13-05-2023</a:t>
             </a:fld>
             <a:endParaRPr lang="en-IN"/>
           </a:p>
@@ -2017,7 +2022,7 @@
           <a:p>
             <a:fld id="{D1D0716B-8702-40F4-8954-70B29D0B46EA}" type="datetimeFigureOut">
               <a:rPr lang="en-IN" smtClean="0"/>
-              <a:t>12-05-2023</a:t>
+              <a:t>13-05-2023</a:t>
             </a:fld>
             <a:endParaRPr lang="en-IN"/>
           </a:p>
@@ -2877,7 +2882,7 @@
           <a:p>
             <a:fld id="{D1D0716B-8702-40F4-8954-70B29D0B46EA}" type="datetimeFigureOut">
               <a:rPr lang="en-IN" smtClean="0"/>
-              <a:t>12-05-2023</a:t>
+              <a:t>13-05-2023</a:t>
             </a:fld>
             <a:endParaRPr lang="en-IN"/>
           </a:p>
@@ -3047,7 +3052,7 @@
           <a:p>
             <a:fld id="{D1D0716B-8702-40F4-8954-70B29D0B46EA}" type="datetimeFigureOut">
               <a:rPr lang="en-IN" smtClean="0"/>
-              <a:t>12-05-2023</a:t>
+              <a:t>13-05-2023</a:t>
             </a:fld>
             <a:endParaRPr lang="en-IN"/>
           </a:p>
@@ -3227,7 +3232,7 @@
           <a:p>
             <a:fld id="{D1D0716B-8702-40F4-8954-70B29D0B46EA}" type="datetimeFigureOut">
               <a:rPr lang="en-IN" smtClean="0"/>
-              <a:t>12-05-2023</a:t>
+              <a:t>13-05-2023</a:t>
             </a:fld>
             <a:endParaRPr lang="en-IN"/>
           </a:p>
@@ -3397,7 +3402,7 @@
           <a:p>
             <a:fld id="{D1D0716B-8702-40F4-8954-70B29D0B46EA}" type="datetimeFigureOut">
               <a:rPr lang="en-IN" smtClean="0"/>
-              <a:t>12-05-2023</a:t>
+              <a:t>13-05-2023</a:t>
             </a:fld>
             <a:endParaRPr lang="en-IN"/>
           </a:p>
@@ -3644,7 +3649,7 @@
           <a:p>
             <a:fld id="{D1D0716B-8702-40F4-8954-70B29D0B46EA}" type="datetimeFigureOut">
               <a:rPr lang="en-IN" smtClean="0"/>
-              <a:t>12-05-2023</a:t>
+              <a:t>13-05-2023</a:t>
             </a:fld>
             <a:endParaRPr lang="en-IN"/>
           </a:p>
@@ -3936,7 +3941,7 @@
           <a:p>
             <a:fld id="{D1D0716B-8702-40F4-8954-70B29D0B46EA}" type="datetimeFigureOut">
               <a:rPr lang="en-IN" smtClean="0"/>
-              <a:t>12-05-2023</a:t>
+              <a:t>13-05-2023</a:t>
             </a:fld>
             <a:endParaRPr lang="en-IN"/>
           </a:p>
@@ -4380,7 +4385,7 @@
           <a:p>
             <a:fld id="{D1D0716B-8702-40F4-8954-70B29D0B46EA}" type="datetimeFigureOut">
               <a:rPr lang="en-IN" smtClean="0"/>
-              <a:t>12-05-2023</a:t>
+              <a:t>13-05-2023</a:t>
             </a:fld>
             <a:endParaRPr lang="en-IN"/>
           </a:p>
@@ -4498,7 +4503,7 @@
           <a:p>
             <a:fld id="{D1D0716B-8702-40F4-8954-70B29D0B46EA}" type="datetimeFigureOut">
               <a:rPr lang="en-IN" smtClean="0"/>
-              <a:t>12-05-2023</a:t>
+              <a:t>13-05-2023</a:t>
             </a:fld>
             <a:endParaRPr lang="en-IN"/>
           </a:p>
@@ -4593,7 +4598,7 @@
           <a:p>
             <a:fld id="{D1D0716B-8702-40F4-8954-70B29D0B46EA}" type="datetimeFigureOut">
               <a:rPr lang="en-IN" smtClean="0"/>
-              <a:t>12-05-2023</a:t>
+              <a:t>13-05-2023</a:t>
             </a:fld>
             <a:endParaRPr lang="en-IN"/>
           </a:p>
@@ -4872,7 +4877,7 @@
           <a:p>
             <a:fld id="{D1D0716B-8702-40F4-8954-70B29D0B46EA}" type="datetimeFigureOut">
               <a:rPr lang="en-IN" smtClean="0"/>
-              <a:t>12-05-2023</a:t>
+              <a:t>13-05-2023</a:t>
             </a:fld>
             <a:endParaRPr lang="en-IN"/>
           </a:p>
@@ -5147,7 +5152,7 @@
           <a:p>
             <a:fld id="{D1D0716B-8702-40F4-8954-70B29D0B46EA}" type="datetimeFigureOut">
               <a:rPr lang="en-IN" smtClean="0"/>
-              <a:t>12-05-2023</a:t>
+              <a:t>13-05-2023</a:t>
             </a:fld>
             <a:endParaRPr lang="en-IN"/>
           </a:p>
@@ -5576,7 +5581,7 @@
           <a:p>
             <a:fld id="{D1D0716B-8702-40F4-8954-70B29D0B46EA}" type="datetimeFigureOut">
               <a:rPr lang="en-IN" smtClean="0"/>
-              <a:t>12-05-2023</a:t>
+              <a:t>13-05-2023</a:t>
             </a:fld>
             <a:endParaRPr lang="en-IN"/>
           </a:p>
@@ -6109,7 +6114,7 @@
           <p:cNvPr id="2" name="Title 1">
             <a:extLst>
               <a:ext uri="{FF2B5EF4-FFF2-40B4-BE49-F238E27FC236}">
-                <a16:creationId xmlns:a16="http://schemas.microsoft.com/office/drawing/2014/main" id="{4986E645-FD2C-0FB7-5A69-E001747A15AB}"/>
+                <a16:creationId xmlns:a16="http://schemas.microsoft.com/office/drawing/2014/main" id="{34DB6CE4-2B13-4715-B5B2-615A55922CA1}"/>
               </a:ext>
             </a:extLst>
           </p:cNvPr>
@@ -6117,47 +6122,593 @@
             <a:spLocks noGrp="1"/>
           </p:cNvSpPr>
           <p:nvPr>
-            <p:ph type="ctrTitle"/>
-          </p:nvPr>
-        </p:nvSpPr>
-        <p:spPr/>
-        <p:txBody>
-          <a:bodyPr/>
+            <p:ph type="title"/>
+          </p:nvPr>
+        </p:nvSpPr>
+        <p:spPr>
+          <a:xfrm>
+            <a:off x="896632" y="3609277"/>
+            <a:ext cx="11115829" cy="1451238"/>
+          </a:xfrm>
+        </p:spPr>
+        <p:txBody>
+          <a:bodyPr>
+            <a:normAutofit/>
+          </a:bodyPr>
           <a:lstStyle/>
           <a:p>
-            <a:endParaRPr lang="en-IN" dirty="0"/>
-          </a:p>
-        </p:txBody>
-      </p:sp>
-      <p:sp>
-        <p:nvSpPr>
-          <p:cNvPr id="3" name="Subtitle 2">
+            <a:r>
+              <a:rPr lang="en-US" sz="4400" dirty="0">
+                <a:latin typeface="Times New Roman" panose="02020603050405020304" pitchFamily="18" charset="0"/>
+                <a:cs typeface="Times New Roman" panose="02020603050405020304" pitchFamily="18" charset="0"/>
+              </a:rPr>
+              <a:t>      </a:t>
+            </a:r>
+            <a:r>
+              <a:rPr lang="en-US" sz="2400" b="1" dirty="0">
+                <a:latin typeface="Times New Roman" panose="02020603050405020304" pitchFamily="18" charset="0"/>
+                <a:cs typeface="Times New Roman" panose="02020603050405020304" pitchFamily="18" charset="0"/>
+              </a:rPr>
+              <a:t>Maulana Azad National Institute of Technology , Bhopal (M.P) </a:t>
+            </a:r>
+            <a:endParaRPr lang="en-US" sz="2400" dirty="0">
+              <a:latin typeface="Times New Roman" panose="02020603050405020304" pitchFamily="18" charset="0"/>
+              <a:cs typeface="Times New Roman" panose="02020603050405020304" pitchFamily="18" charset="0"/>
+            </a:endParaRPr>
+          </a:p>
+        </p:txBody>
+      </p:sp>
+      <p:pic>
+        <p:nvPicPr>
+          <p:cNvPr id="6" name="Picture 5" descr="manit.png">
             <a:extLst>
               <a:ext uri="{FF2B5EF4-FFF2-40B4-BE49-F238E27FC236}">
-                <a16:creationId xmlns:a16="http://schemas.microsoft.com/office/drawing/2014/main" id="{9C962AC3-239E-3153-27CF-B3F5D67A652C}"/>
+                <a16:creationId xmlns:a16="http://schemas.microsoft.com/office/drawing/2014/main" id="{C9168491-D279-440E-81AA-79FF548227FD}"/>
               </a:ext>
             </a:extLst>
           </p:cNvPr>
-          <p:cNvSpPr>
-            <a:spLocks noGrp="1"/>
-          </p:cNvSpPr>
-          <p:nvPr>
-            <p:ph type="subTitle" idx="1"/>
-          </p:nvPr>
-        </p:nvSpPr>
-        <p:spPr/>
-        <p:txBody>
-          <a:bodyPr/>
-          <a:lstStyle/>
-          <a:p>
-            <a:endParaRPr lang="en-IN"/>
+          <p:cNvPicPr>
+            <a:picLocks noChangeAspect="1"/>
+          </p:cNvPicPr>
+          <p:nvPr/>
+        </p:nvPicPr>
+        <p:blipFill>
+          <a:blip r:embed="rId2" cstate="print"/>
+          <a:stretch>
+            <a:fillRect/>
+          </a:stretch>
+        </p:blipFill>
+        <p:spPr>
+          <a:xfrm>
+            <a:off x="5053012" y="334479"/>
+            <a:ext cx="2085975" cy="2200275"/>
+          </a:xfrm>
+          <a:prstGeom prst="rect">
+            <a:avLst/>
+          </a:prstGeom>
+        </p:spPr>
+      </p:pic>
+      <p:sp>
+        <p:nvSpPr>
+          <p:cNvPr id="10" name="Title 1">
+            <a:extLst>
+              <a:ext uri="{FF2B5EF4-FFF2-40B4-BE49-F238E27FC236}">
+                <a16:creationId xmlns:a16="http://schemas.microsoft.com/office/drawing/2014/main" id="{8CFA033D-C628-48AF-9618-A274C970552D}"/>
+              </a:ext>
+            </a:extLst>
+          </p:cNvPr>
+          <p:cNvSpPr txBox="1">
+            <a:spLocks/>
+          </p:cNvSpPr>
+          <p:nvPr/>
+        </p:nvSpPr>
+        <p:spPr>
+          <a:xfrm>
+            <a:off x="937852" y="2523104"/>
+            <a:ext cx="11115829" cy="1451238"/>
+          </a:xfrm>
+          <a:prstGeom prst="rect">
+            <a:avLst/>
+          </a:prstGeom>
+        </p:spPr>
+        <p:txBody>
+          <a:bodyPr vert="horz" lIns="91440" tIns="45720" rIns="91440" bIns="45720" rtlCol="0" anchor="t">
+            <a:normAutofit/>
+          </a:bodyPr>
+          <a:lstStyle>
+            <a:lvl1pPr algn="l" defTabSz="457200" rtl="0" eaLnBrk="1" latinLnBrk="0" hangingPunct="1">
+              <a:spcBef>
+                <a:spcPct val="0"/>
+              </a:spcBef>
+              <a:buNone/>
+              <a:defRPr sz="4200" b="0" i="0" kern="1200">
+                <a:solidFill>
+                  <a:schemeClr val="tx2"/>
+                </a:solidFill>
+                <a:latin typeface="+mj-lt"/>
+                <a:ea typeface="+mj-ea"/>
+                <a:cs typeface="+mj-cs"/>
+              </a:defRPr>
+            </a:lvl1pPr>
+            <a:lvl2pPr eaLnBrk="1" hangingPunct="1">
+              <a:defRPr>
+                <a:solidFill>
+                  <a:schemeClr val="tx2"/>
+                </a:solidFill>
+              </a:defRPr>
+            </a:lvl2pPr>
+            <a:lvl3pPr eaLnBrk="1" hangingPunct="1">
+              <a:defRPr>
+                <a:solidFill>
+                  <a:schemeClr val="tx2"/>
+                </a:solidFill>
+              </a:defRPr>
+            </a:lvl3pPr>
+            <a:lvl4pPr eaLnBrk="1" hangingPunct="1">
+              <a:defRPr>
+                <a:solidFill>
+                  <a:schemeClr val="tx2"/>
+                </a:solidFill>
+              </a:defRPr>
+            </a:lvl4pPr>
+            <a:lvl5pPr eaLnBrk="1" hangingPunct="1">
+              <a:defRPr>
+                <a:solidFill>
+                  <a:schemeClr val="tx2"/>
+                </a:solidFill>
+              </a:defRPr>
+            </a:lvl5pPr>
+            <a:lvl6pPr eaLnBrk="1" hangingPunct="1">
+              <a:defRPr>
+                <a:solidFill>
+                  <a:schemeClr val="tx2"/>
+                </a:solidFill>
+              </a:defRPr>
+            </a:lvl6pPr>
+            <a:lvl7pPr eaLnBrk="1" hangingPunct="1">
+              <a:defRPr>
+                <a:solidFill>
+                  <a:schemeClr val="tx2"/>
+                </a:solidFill>
+              </a:defRPr>
+            </a:lvl7pPr>
+            <a:lvl8pPr eaLnBrk="1" hangingPunct="1">
+              <a:defRPr>
+                <a:solidFill>
+                  <a:schemeClr val="tx2"/>
+                </a:solidFill>
+              </a:defRPr>
+            </a:lvl8pPr>
+            <a:lvl9pPr eaLnBrk="1" hangingPunct="1">
+              <a:defRPr>
+                <a:solidFill>
+                  <a:schemeClr val="tx2"/>
+                </a:solidFill>
+              </a:defRPr>
+            </a:lvl9pPr>
+          </a:lstStyle>
+          <a:p>
+            <a:r>
+              <a:rPr lang="en-US" sz="4400" dirty="0">
+                <a:latin typeface="Times New Roman" panose="02020603050405020304" pitchFamily="18" charset="0"/>
+                <a:cs typeface="Times New Roman" panose="02020603050405020304" pitchFamily="18" charset="0"/>
+              </a:rPr>
+              <a:t> </a:t>
+            </a:r>
+            <a:r>
+              <a:rPr lang="en-US" sz="2400" b="1" dirty="0">
+                <a:latin typeface="Times New Roman" panose="02020603050405020304" pitchFamily="18" charset="0"/>
+                <a:cs typeface="Times New Roman" panose="02020603050405020304" pitchFamily="18" charset="0"/>
+              </a:rPr>
+              <a:t>               Department of Mathematics &amp; Computer Application </a:t>
+            </a:r>
+            <a:endParaRPr lang="en-US" sz="2400" dirty="0">
+              <a:latin typeface="Times New Roman" panose="02020603050405020304" pitchFamily="18" charset="0"/>
+              <a:cs typeface="Times New Roman" panose="02020603050405020304" pitchFamily="18" charset="0"/>
+            </a:endParaRPr>
+          </a:p>
+        </p:txBody>
+      </p:sp>
+      <p:sp>
+        <p:nvSpPr>
+          <p:cNvPr id="11" name="Title 1">
+            <a:extLst>
+              <a:ext uri="{FF2B5EF4-FFF2-40B4-BE49-F238E27FC236}">
+                <a16:creationId xmlns:a16="http://schemas.microsoft.com/office/drawing/2014/main" id="{9DDF8752-6D68-459A-8CD3-E7D63701E560}"/>
+              </a:ext>
+            </a:extLst>
+          </p:cNvPr>
+          <p:cNvSpPr txBox="1">
+            <a:spLocks/>
+          </p:cNvSpPr>
+          <p:nvPr/>
+        </p:nvSpPr>
+        <p:spPr>
+          <a:xfrm>
+            <a:off x="3924288" y="4334896"/>
+            <a:ext cx="5060515" cy="1088487"/>
+          </a:xfrm>
+          <a:prstGeom prst="rect">
+            <a:avLst/>
+          </a:prstGeom>
+        </p:spPr>
+        <p:txBody>
+          <a:bodyPr vert="horz" lIns="91440" tIns="45720" rIns="91440" bIns="45720" rtlCol="0" anchor="t">
+            <a:normAutofit lnSpcReduction="10000"/>
+          </a:bodyPr>
+          <a:lstStyle>
+            <a:lvl1pPr algn="l" defTabSz="457200" rtl="0" eaLnBrk="1" latinLnBrk="0" hangingPunct="1">
+              <a:spcBef>
+                <a:spcPct val="0"/>
+              </a:spcBef>
+              <a:buNone/>
+              <a:defRPr sz="4200" b="0" i="0" kern="1200">
+                <a:solidFill>
+                  <a:schemeClr val="tx2"/>
+                </a:solidFill>
+                <a:latin typeface="+mj-lt"/>
+                <a:ea typeface="+mj-ea"/>
+                <a:cs typeface="+mj-cs"/>
+              </a:defRPr>
+            </a:lvl1pPr>
+            <a:lvl2pPr eaLnBrk="1" hangingPunct="1">
+              <a:defRPr>
+                <a:solidFill>
+                  <a:schemeClr val="tx2"/>
+                </a:solidFill>
+              </a:defRPr>
+            </a:lvl2pPr>
+            <a:lvl3pPr eaLnBrk="1" hangingPunct="1">
+              <a:defRPr>
+                <a:solidFill>
+                  <a:schemeClr val="tx2"/>
+                </a:solidFill>
+              </a:defRPr>
+            </a:lvl3pPr>
+            <a:lvl4pPr eaLnBrk="1" hangingPunct="1">
+              <a:defRPr>
+                <a:solidFill>
+                  <a:schemeClr val="tx2"/>
+                </a:solidFill>
+              </a:defRPr>
+            </a:lvl4pPr>
+            <a:lvl5pPr eaLnBrk="1" hangingPunct="1">
+              <a:defRPr>
+                <a:solidFill>
+                  <a:schemeClr val="tx2"/>
+                </a:solidFill>
+              </a:defRPr>
+            </a:lvl5pPr>
+            <a:lvl6pPr eaLnBrk="1" hangingPunct="1">
+              <a:defRPr>
+                <a:solidFill>
+                  <a:schemeClr val="tx2"/>
+                </a:solidFill>
+              </a:defRPr>
+            </a:lvl6pPr>
+            <a:lvl7pPr eaLnBrk="1" hangingPunct="1">
+              <a:defRPr>
+                <a:solidFill>
+                  <a:schemeClr val="tx2"/>
+                </a:solidFill>
+              </a:defRPr>
+            </a:lvl7pPr>
+            <a:lvl8pPr eaLnBrk="1" hangingPunct="1">
+              <a:defRPr>
+                <a:solidFill>
+                  <a:schemeClr val="tx2"/>
+                </a:solidFill>
+              </a:defRPr>
+            </a:lvl8pPr>
+            <a:lvl9pPr eaLnBrk="1" hangingPunct="1">
+              <a:defRPr>
+                <a:solidFill>
+                  <a:schemeClr val="tx2"/>
+                </a:solidFill>
+              </a:defRPr>
+            </a:lvl9pPr>
+          </a:lstStyle>
+          <a:p>
+            <a:r>
+              <a:rPr lang="en-US" sz="4400" dirty="0"/>
+              <a:t>        </a:t>
+            </a:r>
+            <a:r>
+              <a:rPr lang="en-US" sz="2400" b="1" dirty="0">
+                <a:latin typeface="Times New Roman" panose="02020603050405020304" pitchFamily="18" charset="0"/>
+                <a:cs typeface="Times New Roman" panose="02020603050405020304" pitchFamily="18" charset="0"/>
+              </a:rPr>
+              <a:t>Project</a:t>
+            </a:r>
+          </a:p>
+          <a:p>
+            <a:r>
+              <a:rPr lang="en-US" sz="2400" b="1" dirty="0">
+                <a:latin typeface="Times New Roman" panose="02020603050405020304" pitchFamily="18" charset="0"/>
+                <a:cs typeface="Times New Roman" panose="02020603050405020304" pitchFamily="18" charset="0"/>
+              </a:rPr>
+              <a:t>   NOVAFIT a Fitness App</a:t>
+            </a:r>
+            <a:endParaRPr lang="en-US" sz="2400" dirty="0">
+              <a:latin typeface="Times New Roman" panose="02020603050405020304" pitchFamily="18" charset="0"/>
+              <a:cs typeface="Times New Roman" panose="02020603050405020304" pitchFamily="18" charset="0"/>
+            </a:endParaRPr>
+          </a:p>
+        </p:txBody>
+      </p:sp>
+      <p:sp>
+        <p:nvSpPr>
+          <p:cNvPr id="12" name="Title 1">
+            <a:extLst>
+              <a:ext uri="{FF2B5EF4-FFF2-40B4-BE49-F238E27FC236}">
+                <a16:creationId xmlns:a16="http://schemas.microsoft.com/office/drawing/2014/main" id="{2AEAEE92-58F2-415A-8FF5-528B7D6993BD}"/>
+              </a:ext>
+            </a:extLst>
+          </p:cNvPr>
+          <p:cNvSpPr txBox="1">
+            <a:spLocks/>
+          </p:cNvSpPr>
+          <p:nvPr/>
+        </p:nvSpPr>
+        <p:spPr>
+          <a:xfrm>
+            <a:off x="337668" y="5421069"/>
+            <a:ext cx="3217948" cy="1439865"/>
+          </a:xfrm>
+          <a:prstGeom prst="rect">
+            <a:avLst/>
+          </a:prstGeom>
+        </p:spPr>
+        <p:txBody>
+          <a:bodyPr vert="horz" lIns="91440" tIns="45720" rIns="91440" bIns="45720" rtlCol="0" anchor="t">
+            <a:normAutofit lnSpcReduction="10000"/>
+          </a:bodyPr>
+          <a:lstStyle>
+            <a:lvl1pPr algn="l" defTabSz="457200" rtl="0" eaLnBrk="1" latinLnBrk="0" hangingPunct="1">
+              <a:spcBef>
+                <a:spcPct val="0"/>
+              </a:spcBef>
+              <a:buNone/>
+              <a:defRPr sz="4200" b="0" i="0" kern="1200">
+                <a:solidFill>
+                  <a:schemeClr val="tx2"/>
+                </a:solidFill>
+                <a:latin typeface="+mj-lt"/>
+                <a:ea typeface="+mj-ea"/>
+                <a:cs typeface="+mj-cs"/>
+              </a:defRPr>
+            </a:lvl1pPr>
+            <a:lvl2pPr eaLnBrk="1" hangingPunct="1">
+              <a:defRPr>
+                <a:solidFill>
+                  <a:schemeClr val="tx2"/>
+                </a:solidFill>
+              </a:defRPr>
+            </a:lvl2pPr>
+            <a:lvl3pPr eaLnBrk="1" hangingPunct="1">
+              <a:defRPr>
+                <a:solidFill>
+                  <a:schemeClr val="tx2"/>
+                </a:solidFill>
+              </a:defRPr>
+            </a:lvl3pPr>
+            <a:lvl4pPr eaLnBrk="1" hangingPunct="1">
+              <a:defRPr>
+                <a:solidFill>
+                  <a:schemeClr val="tx2"/>
+                </a:solidFill>
+              </a:defRPr>
+            </a:lvl4pPr>
+            <a:lvl5pPr eaLnBrk="1" hangingPunct="1">
+              <a:defRPr>
+                <a:solidFill>
+                  <a:schemeClr val="tx2"/>
+                </a:solidFill>
+              </a:defRPr>
+            </a:lvl5pPr>
+            <a:lvl6pPr eaLnBrk="1" hangingPunct="1">
+              <a:defRPr>
+                <a:solidFill>
+                  <a:schemeClr val="tx2"/>
+                </a:solidFill>
+              </a:defRPr>
+            </a:lvl6pPr>
+            <a:lvl7pPr eaLnBrk="1" hangingPunct="1">
+              <a:defRPr>
+                <a:solidFill>
+                  <a:schemeClr val="tx2"/>
+                </a:solidFill>
+              </a:defRPr>
+            </a:lvl7pPr>
+            <a:lvl8pPr eaLnBrk="1" hangingPunct="1">
+              <a:defRPr>
+                <a:solidFill>
+                  <a:schemeClr val="tx2"/>
+                </a:solidFill>
+              </a:defRPr>
+            </a:lvl8pPr>
+            <a:lvl9pPr eaLnBrk="1" hangingPunct="1">
+              <a:defRPr>
+                <a:solidFill>
+                  <a:schemeClr val="tx2"/>
+                </a:solidFill>
+              </a:defRPr>
+            </a:lvl9pPr>
+          </a:lstStyle>
+          <a:p>
+            <a:r>
+              <a:rPr lang="en-US" sz="4400" dirty="0">
+                <a:latin typeface="Times New Roman" panose="02020603050405020304" pitchFamily="18" charset="0"/>
+                <a:cs typeface="Times New Roman" panose="02020603050405020304" pitchFamily="18" charset="0"/>
+              </a:rPr>
+              <a:t> </a:t>
+            </a:r>
+            <a:r>
+              <a:rPr lang="en-US" sz="2400" b="1" dirty="0">
+                <a:latin typeface="Times New Roman" panose="02020603050405020304" pitchFamily="18" charset="0"/>
+                <a:cs typeface="Times New Roman" panose="02020603050405020304" pitchFamily="18" charset="0"/>
+              </a:rPr>
+              <a:t>Submitted By</a:t>
+            </a:r>
+          </a:p>
+          <a:p>
+            <a:r>
+              <a:rPr lang="en-US" sz="2400" b="1" dirty="0">
+                <a:latin typeface="Times New Roman" panose="02020603050405020304" pitchFamily="18" charset="0"/>
+                <a:cs typeface="Times New Roman" panose="02020603050405020304" pitchFamily="18" charset="0"/>
+              </a:rPr>
+              <a:t>  Abhishek Singh</a:t>
+            </a:r>
+          </a:p>
+          <a:p>
+            <a:r>
+              <a:rPr lang="en-US" sz="2400" b="1" dirty="0">
+                <a:latin typeface="Times New Roman" panose="02020603050405020304" pitchFamily="18" charset="0"/>
+                <a:cs typeface="Times New Roman" panose="02020603050405020304" pitchFamily="18" charset="0"/>
+              </a:rPr>
+              <a:t>  202120045</a:t>
+            </a:r>
+            <a:endParaRPr lang="en-US" sz="2400" dirty="0">
+              <a:latin typeface="Times New Roman" panose="02020603050405020304" pitchFamily="18" charset="0"/>
+              <a:cs typeface="Times New Roman" panose="02020603050405020304" pitchFamily="18" charset="0"/>
+            </a:endParaRPr>
+          </a:p>
+        </p:txBody>
+      </p:sp>
+      <p:sp>
+        <p:nvSpPr>
+          <p:cNvPr id="13" name="Title 1">
+            <a:extLst>
+              <a:ext uri="{FF2B5EF4-FFF2-40B4-BE49-F238E27FC236}">
+                <a16:creationId xmlns:a16="http://schemas.microsoft.com/office/drawing/2014/main" id="{4D315376-6B30-43FE-9085-1CD49EDC0E71}"/>
+              </a:ext>
+            </a:extLst>
+          </p:cNvPr>
+          <p:cNvSpPr txBox="1">
+            <a:spLocks/>
+          </p:cNvSpPr>
+          <p:nvPr/>
+        </p:nvSpPr>
+        <p:spPr>
+          <a:xfrm>
+            <a:off x="8810625" y="5279706"/>
+            <a:ext cx="3381375" cy="1451238"/>
+          </a:xfrm>
+          <a:prstGeom prst="rect">
+            <a:avLst/>
+          </a:prstGeom>
+        </p:spPr>
+        <p:txBody>
+          <a:bodyPr vert="horz" lIns="91440" tIns="45720" rIns="91440" bIns="45720" rtlCol="0" anchor="t">
+            <a:normAutofit/>
+          </a:bodyPr>
+          <a:lstStyle>
+            <a:lvl1pPr algn="l" defTabSz="457200" rtl="0" eaLnBrk="1" latinLnBrk="0" hangingPunct="1">
+              <a:spcBef>
+                <a:spcPct val="0"/>
+              </a:spcBef>
+              <a:buNone/>
+              <a:defRPr sz="4200" b="0" i="0" kern="1200">
+                <a:solidFill>
+                  <a:schemeClr val="tx2"/>
+                </a:solidFill>
+                <a:latin typeface="+mj-lt"/>
+                <a:ea typeface="+mj-ea"/>
+                <a:cs typeface="+mj-cs"/>
+              </a:defRPr>
+            </a:lvl1pPr>
+            <a:lvl2pPr eaLnBrk="1" hangingPunct="1">
+              <a:defRPr>
+                <a:solidFill>
+                  <a:schemeClr val="tx2"/>
+                </a:solidFill>
+              </a:defRPr>
+            </a:lvl2pPr>
+            <a:lvl3pPr eaLnBrk="1" hangingPunct="1">
+              <a:defRPr>
+                <a:solidFill>
+                  <a:schemeClr val="tx2"/>
+                </a:solidFill>
+              </a:defRPr>
+            </a:lvl3pPr>
+            <a:lvl4pPr eaLnBrk="1" hangingPunct="1">
+              <a:defRPr>
+                <a:solidFill>
+                  <a:schemeClr val="tx2"/>
+                </a:solidFill>
+              </a:defRPr>
+            </a:lvl4pPr>
+            <a:lvl5pPr eaLnBrk="1" hangingPunct="1">
+              <a:defRPr>
+                <a:solidFill>
+                  <a:schemeClr val="tx2"/>
+                </a:solidFill>
+              </a:defRPr>
+            </a:lvl5pPr>
+            <a:lvl6pPr eaLnBrk="1" hangingPunct="1">
+              <a:defRPr>
+                <a:solidFill>
+                  <a:schemeClr val="tx2"/>
+                </a:solidFill>
+              </a:defRPr>
+            </a:lvl6pPr>
+            <a:lvl7pPr eaLnBrk="1" hangingPunct="1">
+              <a:defRPr>
+                <a:solidFill>
+                  <a:schemeClr val="tx2"/>
+                </a:solidFill>
+              </a:defRPr>
+            </a:lvl7pPr>
+            <a:lvl8pPr eaLnBrk="1" hangingPunct="1">
+              <a:defRPr>
+                <a:solidFill>
+                  <a:schemeClr val="tx2"/>
+                </a:solidFill>
+              </a:defRPr>
+            </a:lvl8pPr>
+            <a:lvl9pPr eaLnBrk="1" hangingPunct="1">
+              <a:defRPr>
+                <a:solidFill>
+                  <a:schemeClr val="tx2"/>
+                </a:solidFill>
+              </a:defRPr>
+            </a:lvl9pPr>
+          </a:lstStyle>
+          <a:p>
+            <a:r>
+              <a:rPr lang="en-US" sz="4400" dirty="0">
+                <a:latin typeface="Times New Roman" panose="02020603050405020304" pitchFamily="18" charset="0"/>
+                <a:cs typeface="Times New Roman" panose="02020603050405020304" pitchFamily="18" charset="0"/>
+              </a:rPr>
+              <a:t> </a:t>
+            </a:r>
+            <a:r>
+              <a:rPr lang="en-US" sz="2400" b="1" dirty="0">
+                <a:latin typeface="Times New Roman" panose="02020603050405020304" pitchFamily="18" charset="0"/>
+                <a:cs typeface="Times New Roman" panose="02020603050405020304" pitchFamily="18" charset="0"/>
+              </a:rPr>
+              <a:t>Submitted To</a:t>
+            </a:r>
+          </a:p>
+          <a:p>
+            <a:r>
+              <a:rPr lang="en-US" sz="2400" b="1" dirty="0">
+                <a:latin typeface="Times New Roman" panose="02020603050405020304" pitchFamily="18" charset="0"/>
+                <a:cs typeface="Times New Roman" panose="02020603050405020304" pitchFamily="18" charset="0"/>
+              </a:rPr>
+              <a:t>  Dr. Sanjay Sharma</a:t>
+            </a:r>
+            <a:endParaRPr lang="en-US" sz="2400" dirty="0">
+              <a:latin typeface="Times New Roman" panose="02020603050405020304" pitchFamily="18" charset="0"/>
+              <a:cs typeface="Times New Roman" panose="02020603050405020304" pitchFamily="18" charset="0"/>
+            </a:endParaRPr>
           </a:p>
         </p:txBody>
       </p:sp>
     </p:spTree>
     <p:extLst>
       <p:ext uri="{BB962C8B-B14F-4D97-AF65-F5344CB8AC3E}">
-        <p14:creationId xmlns:p14="http://schemas.microsoft.com/office/powerpoint/2010/main" val="4154538814"/>
+        <p14:creationId xmlns:p14="http://schemas.microsoft.com/office/powerpoint/2010/main" val="3253689747"/>
       </p:ext>
     </p:extLst>
   </p:cSld>
@@ -6780,7 +7331,7 @@
         </p:blipFill>
         <p:spPr>
           <a:xfrm>
-            <a:off x="6188075" y="277813"/>
+            <a:off x="6188075" y="258763"/>
             <a:ext cx="6003925" cy="2820987"/>
           </a:xfrm>
         </p:spPr>
@@ -7711,8 +8262,8 @@
         </p:nvSpPr>
         <p:spPr>
           <a:xfrm>
-            <a:off x="3595457" y="2636667"/>
-            <a:ext cx="5299968" cy="1200329"/>
+            <a:off x="3105150" y="2636667"/>
+            <a:ext cx="5790275" cy="1200329"/>
           </a:xfrm>
           <a:prstGeom prst="rect">
             <a:avLst/>
@@ -7737,7 +8288,7 @@
                 <a:latin typeface="Times New Roman" panose="02020603050405020304" pitchFamily="18" charset="0"/>
                 <a:cs typeface="Times New Roman" panose="02020603050405020304" pitchFamily="18" charset="0"/>
               </a:rPr>
-              <a:t>THANKYOU</a:t>
+              <a:t> THANK YOU</a:t>
             </a:r>
           </a:p>
         </p:txBody>
@@ -8939,7 +9490,19 @@
               <a:rPr lang="en-US" sz="2200" b="1" i="0" u="none" strike="noStrike" baseline="0" dirty="0">
                 <a:latin typeface="Times New Roman" panose="02020603050405020304" pitchFamily="18" charset="0"/>
               </a:rPr>
-              <a:t>3. React: </a:t>
+              <a:t>3. React </a:t>
+            </a:r>
+            <a:r>
+              <a:rPr lang="en-US" sz="2200" b="1" i="0" u="none" strike="noStrike" baseline="0" dirty="0" err="1">
+                <a:latin typeface="Times New Roman" panose="02020603050405020304" pitchFamily="18" charset="0"/>
+              </a:rPr>
+              <a:t>js</a:t>
+            </a:r>
+            <a:r>
+              <a:rPr lang="en-US" sz="2200" b="1" i="0" u="none" strike="noStrike" baseline="0" dirty="0">
+                <a:latin typeface="Times New Roman" panose="02020603050405020304" pitchFamily="18" charset="0"/>
+              </a:rPr>
+              <a:t>: </a:t>
             </a:r>
             <a:r>
               <a:rPr lang="en-US" sz="2200" b="0" i="0" u="none" strike="noStrike" baseline="0" dirty="0">
@@ -9191,7 +9754,7 @@
                 <a:latin typeface="Times New Roman" panose="02020603050405020304" pitchFamily="18" charset="0"/>
                 <a:cs typeface="Times New Roman" panose="02020603050405020304" pitchFamily="18" charset="0"/>
               </a:rPr>
-              <a:t>Trainer Signup</a:t>
+              <a:t>Trainer Login</a:t>
             </a:r>
           </a:p>
           <a:p>
@@ -9297,7 +9860,7 @@
                 <a:latin typeface="Times New Roman" panose="02020603050405020304" pitchFamily="18" charset="0"/>
                 <a:cs typeface="Times New Roman" panose="02020603050405020304" pitchFamily="18" charset="0"/>
               </a:rPr>
-              <a:t>Trainer Signup</a:t>
+              <a:t>Trainee Signup</a:t>
             </a:r>
           </a:p>
           <a:p>

</xml_diff>